<commit_message>
update picture on slides
</commit_message>
<xml_diff>
--- a/gender_detection_on_the_web_final.pptx
+++ b/gender_detection_on_the_web_final.pptx
@@ -2071,7 +2071,7 @@
           <a:p>
             <a:fld id="{8DF71321-24A7-4C86-9B2D-07409676CE90}" type="datetime1">
               <a:rPr lang="de-DE" smtClean="0"/>
-              <a:t>11.01.19</a:t>
+              <a:t>14.01.19</a:t>
             </a:fld>
             <a:endParaRPr lang="de-DE" dirty="0"/>
           </a:p>
@@ -2227,7 +2227,7 @@
           <a:p>
             <a:fld id="{FE96C0C9-FF0A-496C-A493-0CBBCA7B95F1}" type="datetime1">
               <a:rPr lang="de-DE" smtClean="0"/>
-              <a:t>11.01.19</a:t>
+              <a:t>14.01.19</a:t>
             </a:fld>
             <a:endParaRPr lang="de-DE" dirty="0"/>
           </a:p>
@@ -2373,7 +2373,7 @@
           <a:p>
             <a:fld id="{758B048A-BE43-4B2C-86D4-158ABE1766B8}" type="datetime1">
               <a:rPr lang="de-DE" smtClean="0"/>
-              <a:t>11.01.19</a:t>
+              <a:t>14.01.19</a:t>
             </a:fld>
             <a:endParaRPr lang="de-DE" dirty="0"/>
           </a:p>
@@ -2541,7 +2541,7 @@
           <a:p>
             <a:fld id="{FDA7073C-0E08-449C-A19B-5CA9470AE454}" type="datetime1">
               <a:rPr lang="de-DE" smtClean="0"/>
-              <a:t>11.01.19</a:t>
+              <a:t>14.01.19</a:t>
             </a:fld>
             <a:endParaRPr lang="de-DE" dirty="0"/>
           </a:p>
@@ -2805,7 +2805,7 @@
           <a:p>
             <a:fld id="{DA1259D3-E13F-4716-8DCE-AE2F8587B726}" type="datetime1">
               <a:rPr lang="de-DE" smtClean="0"/>
-              <a:t>11.01.19</a:t>
+              <a:t>14.01.19</a:t>
             </a:fld>
             <a:endParaRPr lang="de-DE" dirty="0"/>
           </a:p>
@@ -3208,7 +3208,7 @@
           <a:p>
             <a:fld id="{54EF5892-6737-42F1-A80B-E53B7AE92043}" type="datetime1">
               <a:rPr lang="de-DE" smtClean="0"/>
-              <a:t>11.01.19</a:t>
+              <a:t>14.01.19</a:t>
             </a:fld>
             <a:endParaRPr lang="de-DE" dirty="0"/>
           </a:p>
@@ -3302,7 +3302,7 @@
           <a:p>
             <a:fld id="{9CC00441-755C-4787-AFFB-F34894DC5D84}" type="datetime1">
               <a:rPr lang="de-DE" smtClean="0"/>
-              <a:t>11.01.19</a:t>
+              <a:t>14.01.19</a:t>
             </a:fld>
             <a:endParaRPr lang="de-DE" dirty="0"/>
           </a:p>
@@ -3373,7 +3373,7 @@
           <a:p>
             <a:fld id="{70DAD1D6-C209-4937-9344-D453C1DB59A4}" type="datetime1">
               <a:rPr lang="de-DE" smtClean="0"/>
-              <a:t>11.01.19</a:t>
+              <a:t>14.01.19</a:t>
             </a:fld>
             <a:endParaRPr lang="de-DE" dirty="0"/>
           </a:p>
@@ -3664,7 +3664,7 @@
           <a:p>
             <a:fld id="{0E0E16C4-79B5-4CCD-9BE7-D0FC42B32989}" type="datetime1">
               <a:rPr lang="de-DE" smtClean="0"/>
-              <a:t>11.01.19</a:t>
+              <a:t>14.01.19</a:t>
             </a:fld>
             <a:endParaRPr lang="de-DE" dirty="0"/>
           </a:p>
@@ -3898,7 +3898,7 @@
           <a:p>
             <a:fld id="{64795827-6224-4570-B3E0-C448CE9AB11A}" type="datetime1">
               <a:rPr lang="de-DE" smtClean="0"/>
-              <a:t>11.01.19</a:t>
+              <a:t>14.01.19</a:t>
             </a:fld>
             <a:endParaRPr lang="de-DE" dirty="0"/>
           </a:p>
@@ -4309,7 +4309,7 @@
           <a:p>
             <a:fld id="{22C9B90C-F1F4-41D2-8EEE-A2460906CE98}" type="datetime1">
               <a:rPr lang="de-DE" smtClean="0"/>
-              <a:t>11.01.19</a:t>
+              <a:t>14.01.19</a:t>
             </a:fld>
             <a:endParaRPr lang="de-DE" dirty="0"/>
           </a:p>
@@ -4763,7 +4763,7 @@
           <a:p>
             <a:fld id="{758B048A-BE43-4B2C-86D4-158ABE1766B8}" type="datetime1">
               <a:rPr lang="de-DE" smtClean="0"/>
-              <a:t>11.01.19</a:t>
+              <a:t>14.01.19</a:t>
             </a:fld>
             <a:endParaRPr lang="de-DE" dirty="0"/>
           </a:p>
@@ -7516,10 +7516,10 @@
       </p:pic>
       <p:pic>
         <p:nvPicPr>
-          <p:cNvPr id="5" name="Picture 4">
+          <p:cNvPr id="2" name="Picture 1">
             <a:extLst>
               <a:ext uri="{FF2B5EF4-FFF2-40B4-BE49-F238E27FC236}">
-                <a16:creationId xmlns:a16="http://schemas.microsoft.com/office/drawing/2014/main" id="{4D580121-0584-9247-8C03-983C6EB72069}"/>
+                <a16:creationId xmlns:a16="http://schemas.microsoft.com/office/drawing/2014/main" id="{BC7A2298-7A3B-3D42-AB49-E4DCB43A7722}"/>
               </a:ext>
             </a:extLst>
           </p:cNvPr>
@@ -7536,8 +7536,8 @@
         </p:blipFill>
         <p:spPr>
           <a:xfrm>
-            <a:off x="5040560" y="1628800"/>
-            <a:ext cx="3995936" cy="1517045"/>
+            <a:off x="5076056" y="1626434"/>
+            <a:ext cx="3960291" cy="1551811"/>
           </a:xfrm>
           <a:prstGeom prst="rect">
             <a:avLst/>

</xml_diff>

<commit_message>
update latex and final presentation slides
</commit_message>
<xml_diff>
--- a/gender_detection_on_the_web_final.pptx
+++ b/gender_detection_on_the_web_final.pptx
@@ -1790,6 +1790,40 @@
           <a:bodyPr/>
           <a:lstStyle/>
           <a:p>
+            <a:pPr marL="0" marR="0" lvl="0" indent="0" algn="l" defTabSz="914400" rtl="0" eaLnBrk="0" fontAlgn="base" latinLnBrk="0" hangingPunct="0">
+              <a:lnSpc>
+                <a:spcPct val="100000"/>
+              </a:lnSpc>
+              <a:spcBef>
+                <a:spcPct val="30000"/>
+              </a:spcBef>
+              <a:spcAft>
+                <a:spcPct val="0"/>
+              </a:spcAft>
+              <a:buClrTx/>
+              <a:buSzTx/>
+              <a:buFontTx/>
+              <a:buNone/>
+              <a:tabLst/>
+              <a:defRPr/>
+            </a:pPr>
+            <a:r>
+              <a:rPr lang="en-US" sz="1200" kern="1200" dirty="0">
+                <a:solidFill>
+                  <a:schemeClr val="tx1"/>
+                </a:solidFill>
+                <a:effectLst/>
+                <a:latin typeface="Arial" charset="0"/>
+                <a:ea typeface="+mn-ea"/>
+                <a:cs typeface="+mn-cs"/>
+              </a:rPr>
+              <a:t>Cultural differences lead to imbalanced prediction errors </a:t>
+            </a:r>
+            <a:endParaRPr lang="en-US" dirty="0">
+              <a:effectLst/>
+            </a:endParaRPr>
+          </a:p>
+          <a:p>
             <a:endParaRPr lang="en-US" dirty="0"/>
           </a:p>
         </p:txBody>
@@ -2071,7 +2105,7 @@
           <a:p>
             <a:fld id="{8DF71321-24A7-4C86-9B2D-07409676CE90}" type="datetime1">
               <a:rPr lang="de-DE" smtClean="0"/>
-              <a:t>14.01.19</a:t>
+              <a:t>20.01.19</a:t>
             </a:fld>
             <a:endParaRPr lang="de-DE" dirty="0"/>
           </a:p>
@@ -2227,7 +2261,7 @@
           <a:p>
             <a:fld id="{FE96C0C9-FF0A-496C-A493-0CBBCA7B95F1}" type="datetime1">
               <a:rPr lang="de-DE" smtClean="0"/>
-              <a:t>14.01.19</a:t>
+              <a:t>20.01.19</a:t>
             </a:fld>
             <a:endParaRPr lang="de-DE" dirty="0"/>
           </a:p>
@@ -2373,7 +2407,7 @@
           <a:p>
             <a:fld id="{758B048A-BE43-4B2C-86D4-158ABE1766B8}" type="datetime1">
               <a:rPr lang="de-DE" smtClean="0"/>
-              <a:t>14.01.19</a:t>
+              <a:t>20.01.19</a:t>
             </a:fld>
             <a:endParaRPr lang="de-DE" dirty="0"/>
           </a:p>
@@ -2541,7 +2575,7 @@
           <a:p>
             <a:fld id="{FDA7073C-0E08-449C-A19B-5CA9470AE454}" type="datetime1">
               <a:rPr lang="de-DE" smtClean="0"/>
-              <a:t>14.01.19</a:t>
+              <a:t>20.01.19</a:t>
             </a:fld>
             <a:endParaRPr lang="de-DE" dirty="0"/>
           </a:p>
@@ -2805,7 +2839,7 @@
           <a:p>
             <a:fld id="{DA1259D3-E13F-4716-8DCE-AE2F8587B726}" type="datetime1">
               <a:rPr lang="de-DE" smtClean="0"/>
-              <a:t>14.01.19</a:t>
+              <a:t>20.01.19</a:t>
             </a:fld>
             <a:endParaRPr lang="de-DE" dirty="0"/>
           </a:p>
@@ -3208,7 +3242,7 @@
           <a:p>
             <a:fld id="{54EF5892-6737-42F1-A80B-E53B7AE92043}" type="datetime1">
               <a:rPr lang="de-DE" smtClean="0"/>
-              <a:t>14.01.19</a:t>
+              <a:t>20.01.19</a:t>
             </a:fld>
             <a:endParaRPr lang="de-DE" dirty="0"/>
           </a:p>
@@ -3302,7 +3336,7 @@
           <a:p>
             <a:fld id="{9CC00441-755C-4787-AFFB-F34894DC5D84}" type="datetime1">
               <a:rPr lang="de-DE" smtClean="0"/>
-              <a:t>14.01.19</a:t>
+              <a:t>20.01.19</a:t>
             </a:fld>
             <a:endParaRPr lang="de-DE" dirty="0"/>
           </a:p>
@@ -3373,7 +3407,7 @@
           <a:p>
             <a:fld id="{70DAD1D6-C209-4937-9344-D453C1DB59A4}" type="datetime1">
               <a:rPr lang="de-DE" smtClean="0"/>
-              <a:t>14.01.19</a:t>
+              <a:t>20.01.19</a:t>
             </a:fld>
             <a:endParaRPr lang="de-DE" dirty="0"/>
           </a:p>
@@ -3664,7 +3698,7 @@
           <a:p>
             <a:fld id="{0E0E16C4-79B5-4CCD-9BE7-D0FC42B32989}" type="datetime1">
               <a:rPr lang="de-DE" smtClean="0"/>
-              <a:t>14.01.19</a:t>
+              <a:t>20.01.19</a:t>
             </a:fld>
             <a:endParaRPr lang="de-DE" dirty="0"/>
           </a:p>
@@ -3898,7 +3932,7 @@
           <a:p>
             <a:fld id="{64795827-6224-4570-B3E0-C448CE9AB11A}" type="datetime1">
               <a:rPr lang="de-DE" smtClean="0"/>
-              <a:t>14.01.19</a:t>
+              <a:t>20.01.19</a:t>
             </a:fld>
             <a:endParaRPr lang="de-DE" dirty="0"/>
           </a:p>
@@ -4309,7 +4343,7 @@
           <a:p>
             <a:fld id="{22C9B90C-F1F4-41D2-8EEE-A2460906CE98}" type="datetime1">
               <a:rPr lang="de-DE" smtClean="0"/>
-              <a:t>14.01.19</a:t>
+              <a:t>20.01.19</a:t>
             </a:fld>
             <a:endParaRPr lang="de-DE" dirty="0"/>
           </a:p>
@@ -4763,7 +4797,7 @@
           <a:p>
             <a:fld id="{758B048A-BE43-4B2C-86D4-158ABE1766B8}" type="datetime1">
               <a:rPr lang="de-DE" smtClean="0"/>
-              <a:t>14.01.19</a:t>
+              <a:t>20.01.19</a:t>
             </a:fld>
             <a:endParaRPr lang="de-DE" dirty="0"/>
           </a:p>
@@ -6912,7 +6946,7 @@
             </a:pPr>
             <a:r>
               <a:rPr lang="en-GB" altLang="zh-CN" sz="1600" dirty="0"/>
-              <a:t>Emails</a:t>
+              <a:t>E-mails</a:t>
             </a:r>
           </a:p>
           <a:p>
@@ -6972,7 +7006,7 @@
             </a:pPr>
             <a:r>
               <a:rPr lang="en-GB" altLang="zh-CN" sz="1600" dirty="0"/>
-              <a:t>Profile Picture</a:t>
+              <a:t>Profile picture</a:t>
             </a:r>
           </a:p>
           <a:p>
@@ -7769,7 +7803,7 @@
             </a:pPr>
             <a:r>
               <a:rPr lang="en-GB" altLang="zh-CN" sz="2000" dirty="0"/>
-              <a:t>Semantic topics: animal, baby, vehicles…</a:t>
+              <a:t>Semantic topics: animal, baby, vehicle…</a:t>
             </a:r>
           </a:p>
           <a:p>
@@ -8885,7 +8919,7 @@
           <p:nvPr>
             <p:extLst>
               <p:ext uri="{D42A27DB-BD31-4B8C-83A1-F6EECF244321}">
-                <p14:modId xmlns:p14="http://schemas.microsoft.com/office/powerpoint/2010/main" val="1526148971"/>
+                <p14:modId xmlns:p14="http://schemas.microsoft.com/office/powerpoint/2010/main" val="2309903295"/>
               </p:ext>
             </p:extLst>
           </p:nvPr>
@@ -9054,7 +9088,7 @@
                         <a:rPr lang="en-US" sz="1800" dirty="0">
                           <a:effectLst/>
                         </a:rPr>
-                        <a:t>82.3%</a:t>
+                        <a:t>82%</a:t>
                       </a:r>
                     </a:p>
                   </a:txBody>
@@ -9122,10 +9156,10 @@
                     <a:p>
                       <a:pPr algn="l"/>
                       <a:r>
-                        <a:rPr lang="en-US" sz="1800">
+                        <a:rPr lang="en-US" sz="1800" dirty="0">
                           <a:effectLst/>
                         </a:rPr>
-                        <a:t>72.3%</a:t>
+                        <a:t>72%</a:t>
                       </a:r>
                     </a:p>
                   </a:txBody>
@@ -9616,7 +9650,7 @@
           <p:nvPr>
             <p:extLst>
               <p:ext uri="{D42A27DB-BD31-4B8C-83A1-F6EECF244321}">
-                <p14:modId xmlns:p14="http://schemas.microsoft.com/office/powerpoint/2010/main" val="3711983573"/>
+                <p14:modId xmlns:p14="http://schemas.microsoft.com/office/powerpoint/2010/main" val="3034189224"/>
               </p:ext>
             </p:extLst>
           </p:nvPr>
@@ -9788,10 +9822,10 @@
                     <a:p>
                       <a:pPr algn="l"/>
                       <a:r>
-                        <a:rPr lang="en-US">
+                        <a:rPr lang="en-US" dirty="0">
                           <a:effectLst/>
                         </a:rPr>
-                        <a:t>75.6%</a:t>
+                        <a:t>76%</a:t>
                       </a:r>
                     </a:p>
                   </a:txBody>
@@ -10768,7 +10802,7 @@
             </a:pPr>
             <a:r>
               <a:rPr lang="en-GB" altLang="zh-CN" sz="2000" dirty="0"/>
-              <a:t>Existing approach not generalize well to language systems [10]</a:t>
+              <a:t>Existing approach not generalize well to language systems </a:t>
             </a:r>
           </a:p>
           <a:p>
@@ -10836,8 +10870,13 @@
             </a:pPr>
             <a:r>
               <a:rPr lang="en-GB" altLang="zh-CN" sz="2000" dirty="0"/>
-              <a:t>Approach can be culture biased [1]</a:t>
-            </a:r>
+              <a:t>Approach can be culture </a:t>
+            </a:r>
+            <a:r>
+              <a:rPr lang="en-GB" altLang="zh-CN" sz="2000"/>
+              <a:t>biased </a:t>
+            </a:r>
+            <a:endParaRPr lang="en-GB" altLang="zh-CN" sz="2000" dirty="0"/>
           </a:p>
           <a:p>
             <a:pPr marL="742950" lvl="1" indent="-285750">
@@ -11113,10 +11152,10 @@
       </p:pic>
       <p:pic>
         <p:nvPicPr>
-          <p:cNvPr id="10" name="Picture 9">
+          <p:cNvPr id="11" name="Picture 10">
             <a:extLst>
               <a:ext uri="{FF2B5EF4-FFF2-40B4-BE49-F238E27FC236}">
-                <a16:creationId xmlns:a16="http://schemas.microsoft.com/office/drawing/2014/main" id="{D1430B09-32B0-274D-BF78-22D0E1B2EB51}"/>
+                <a16:creationId xmlns:a16="http://schemas.microsoft.com/office/drawing/2014/main" id="{403E2484-B189-734D-8780-046A69D3EEB6}"/>
               </a:ext>
             </a:extLst>
           </p:cNvPr>
@@ -11133,8 +11172,8 @@
         </p:blipFill>
         <p:spPr>
           <a:xfrm>
-            <a:off x="1835696" y="3605882"/>
-            <a:ext cx="5454632" cy="2703438"/>
+            <a:off x="1886089" y="1458748"/>
+            <a:ext cx="4376191" cy="1826236"/>
           </a:xfrm>
           <a:prstGeom prst="rect">
             <a:avLst/>
@@ -11143,10 +11182,10 @@
       </p:pic>
       <p:pic>
         <p:nvPicPr>
-          <p:cNvPr id="11" name="Picture 10">
+          <p:cNvPr id="6" name="Picture 5">
             <a:extLst>
               <a:ext uri="{FF2B5EF4-FFF2-40B4-BE49-F238E27FC236}">
-                <a16:creationId xmlns:a16="http://schemas.microsoft.com/office/drawing/2014/main" id="{403E2484-B189-734D-8780-046A69D3EEB6}"/>
+                <a16:creationId xmlns:a16="http://schemas.microsoft.com/office/drawing/2014/main" id="{B63AA53C-4365-9B43-B5B2-7D6BC43C4046}"/>
               </a:ext>
             </a:extLst>
           </p:cNvPr>
@@ -11163,14 +11202,66 @@
         </p:blipFill>
         <p:spPr>
           <a:xfrm>
-            <a:off x="1886089" y="1458748"/>
-            <a:ext cx="4376191" cy="1826236"/>
+            <a:off x="880116" y="3933056"/>
+            <a:ext cx="6480720" cy="2088232"/>
           </a:xfrm>
           <a:prstGeom prst="rect">
             <a:avLst/>
           </a:prstGeom>
         </p:spPr>
       </p:pic>
+      <p:sp>
+        <p:nvSpPr>
+          <p:cNvPr id="8" name="Rectangle 7">
+            <a:extLst>
+              <a:ext uri="{FF2B5EF4-FFF2-40B4-BE49-F238E27FC236}">
+                <a16:creationId xmlns:a16="http://schemas.microsoft.com/office/drawing/2014/main" id="{24BD4770-9894-9240-A7B9-7F745C545F28}"/>
+              </a:ext>
+            </a:extLst>
+          </p:cNvPr>
+          <p:cNvSpPr/>
+          <p:nvPr/>
+        </p:nvSpPr>
+        <p:spPr>
+          <a:xfrm>
+            <a:off x="6012160" y="5301208"/>
+            <a:ext cx="1296144" cy="360040"/>
+          </a:xfrm>
+          <a:prstGeom prst="rect">
+            <a:avLst/>
+          </a:prstGeom>
+          <a:noFill/>
+          <a:ln>
+            <a:solidFill>
+              <a:srgbClr val="FF0000"/>
+            </a:solidFill>
+          </a:ln>
+        </p:spPr>
+        <p:style>
+          <a:lnRef idx="2">
+            <a:schemeClr val="accent1">
+              <a:shade val="50000"/>
+            </a:schemeClr>
+          </a:lnRef>
+          <a:fillRef idx="1">
+            <a:schemeClr val="accent1"/>
+          </a:fillRef>
+          <a:effectRef idx="0">
+            <a:schemeClr val="accent1"/>
+          </a:effectRef>
+          <a:fontRef idx="minor">
+            <a:schemeClr val="lt1"/>
+          </a:fontRef>
+        </p:style>
+        <p:txBody>
+          <a:bodyPr rtlCol="0" anchor="ctr"/>
+          <a:lstStyle/>
+          <a:p>
+            <a:pPr algn="ctr"/>
+            <a:endParaRPr lang="en-US"/>
+          </a:p>
+        </p:txBody>
+      </p:sp>
     </p:spTree>
     <p:extLst>
       <p:ext uri="{BB962C8B-B14F-4D97-AF65-F5344CB8AC3E}">

</xml_diff>